<commit_message>
update day 62 and 63
</commit_message>
<xml_diff>
--- a/_PowerPoints/2nd Semester/Unit 9 ACT/PreCalc_Day_062 Math Mini Test.pptx
+++ b/_PowerPoints/2nd Semester/Unit 9 ACT/PreCalc_Day_062 Math Mini Test.pptx
@@ -5,7 +5,7 @@
     <p:sldMasterId id="2147483648" r:id="rId1"/>
   </p:sldMasterIdLst>
   <p:handoutMasterIdLst>
-    <p:handoutMasterId r:id="rId29"/>
+    <p:handoutMasterId r:id="rId28"/>
   </p:handoutMasterIdLst>
   <p:sldIdLst>
     <p:sldId id="263" r:id="rId2"/>
@@ -33,8 +33,7 @@
     <p:sldId id="280" r:id="rId24"/>
     <p:sldId id="281" r:id="rId25"/>
     <p:sldId id="283" r:id="rId26"/>
-    <p:sldId id="284" r:id="rId27"/>
-    <p:sldId id="285" r:id="rId28"/>
+    <p:sldId id="285" r:id="rId27"/>
   </p:sldIdLst>
   <p:sldSz cx="12192000" cy="6858000"/>
   <p:notesSz cx="9296400" cy="7010400"/>
@@ -223,7 +222,7 @@
           <a:p>
             <a:fld id="{FAC4242D-6570-4D26-878C-5DE8AD62D39F}" type="datetimeFigureOut">
               <a:rPr lang="en-US" smtClean="0"/>
-              <a:t>3/19/2018</a:t>
+              <a:t>3/21/2018</a:t>
             </a:fld>
             <a:endParaRPr lang="en-US"/>
           </a:p>
@@ -476,7 +475,7 @@
             <a:fld id="{87DE6118-2437-4B30-8E3C-4D2BE6020583}" type="datetimeFigureOut">
               <a:rPr lang="en-US" dirty="0"/>
               <a:pPr/>
-              <a:t>3/19/2018</a:t>
+              <a:t>3/21/2018</a:t>
             </a:fld>
             <a:endParaRPr lang="en-US" dirty="0"/>
           </a:p>
@@ -802,7 +801,7 @@
           <a:p>
             <a:fld id="{87DE6118-2437-4B30-8E3C-4D2BE6020583}" type="datetimeFigureOut">
               <a:rPr lang="en-US" dirty="0"/>
-              <a:t>3/19/2018</a:t>
+              <a:t>3/21/2018</a:t>
             </a:fld>
             <a:endParaRPr lang="en-US" dirty="0"/>
           </a:p>
@@ -977,7 +976,7 @@
           <a:p>
             <a:fld id="{87DE6118-2437-4B30-8E3C-4D2BE6020583}" type="datetimeFigureOut">
               <a:rPr lang="en-US" dirty="0"/>
-              <a:t>3/19/2018</a:t>
+              <a:t>3/21/2018</a:t>
             </a:fld>
             <a:endParaRPr lang="en-US" dirty="0"/>
           </a:p>
@@ -1142,7 +1141,7 @@
           <a:p>
             <a:fld id="{87DE6118-2437-4B30-8E3C-4D2BE6020583}" type="datetimeFigureOut">
               <a:rPr lang="en-US" dirty="0"/>
-              <a:t>3/19/2018</a:t>
+              <a:t>3/21/2018</a:t>
             </a:fld>
             <a:endParaRPr lang="en-US" dirty="0"/>
           </a:p>
@@ -1415,7 +1414,7 @@
             <a:fld id="{87DE6118-2437-4B30-8E3C-4D2BE6020583}" type="datetimeFigureOut">
               <a:rPr lang="en-US" dirty="0"/>
               <a:pPr/>
-              <a:t>3/19/2018</a:t>
+              <a:t>3/21/2018</a:t>
             </a:fld>
             <a:endParaRPr lang="en-US" dirty="0"/>
           </a:p>
@@ -1805,7 +1804,7 @@
           <a:p>
             <a:fld id="{87DE6118-2437-4B30-8E3C-4D2BE6020583}" type="datetimeFigureOut">
               <a:rPr lang="en-US" dirty="0"/>
-              <a:t>3/19/2018</a:t>
+              <a:t>3/21/2018</a:t>
             </a:fld>
             <a:endParaRPr lang="en-US" dirty="0"/>
           </a:p>
@@ -2277,7 +2276,7 @@
           <a:p>
             <a:fld id="{87DE6118-2437-4B30-8E3C-4D2BE6020583}" type="datetimeFigureOut">
               <a:rPr lang="en-US" dirty="0"/>
-              <a:t>3/19/2018</a:t>
+              <a:t>3/21/2018</a:t>
             </a:fld>
             <a:endParaRPr lang="en-US" dirty="0"/>
           </a:p>
@@ -2390,7 +2389,7 @@
           <a:p>
             <a:fld id="{87DE6118-2437-4B30-8E3C-4D2BE6020583}" type="datetimeFigureOut">
               <a:rPr lang="en-US" dirty="0"/>
-              <a:t>3/19/2018</a:t>
+              <a:t>3/21/2018</a:t>
             </a:fld>
             <a:endParaRPr lang="en-US" dirty="0"/>
           </a:p>
@@ -2480,7 +2479,7 @@
           <a:p>
             <a:fld id="{87DE6118-2437-4B30-8E3C-4D2BE6020583}" type="datetimeFigureOut">
               <a:rPr lang="en-US" dirty="0"/>
-              <a:t>3/19/2018</a:t>
+              <a:t>3/21/2018</a:t>
             </a:fld>
             <a:endParaRPr lang="en-US" dirty="0"/>
           </a:p>
@@ -2822,7 +2821,7 @@
             <a:fld id="{87DE6118-2437-4B30-8E3C-4D2BE6020583}" type="datetimeFigureOut">
               <a:rPr lang="en-US" dirty="0"/>
               <a:pPr/>
-              <a:t>3/19/2018</a:t>
+              <a:t>3/21/2018</a:t>
             </a:fld>
             <a:endParaRPr lang="en-US" dirty="0"/>
           </a:p>
@@ -3207,7 +3206,7 @@
             <a:fld id="{87DE6118-2437-4B30-8E3C-4D2BE6020583}" type="datetimeFigureOut">
               <a:rPr lang="en-US" dirty="0"/>
               <a:pPr/>
-              <a:t>3/19/2018</a:t>
+              <a:t>3/21/2018</a:t>
             </a:fld>
             <a:endParaRPr lang="en-US" dirty="0"/>
           </a:p>
@@ -3482,7 +3481,7 @@
             <a:fld id="{87DE6118-2437-4B30-8E3C-4D2BE6020583}" type="datetimeFigureOut">
               <a:rPr lang="en-US" dirty="0"/>
               <a:pPr/>
-              <a:t>3/19/2018</a:t>
+              <a:t>3/21/2018</a:t>
             </a:fld>
             <a:endParaRPr lang="en-US" dirty="0"/>
           </a:p>
@@ -4042,11 +4041,7 @@
           <a:p>
             <a:r>
               <a:rPr lang="en-US" dirty="0" smtClean="0"/>
-              <a:t>Day </a:t>
-            </a:r>
-            <a:r>
-              <a:rPr lang="en-US" dirty="0" smtClean="0"/>
-              <a:t>62</a:t>
+              <a:t>Day 62</a:t>
             </a:r>
             <a:endParaRPr lang="en-US" dirty="0"/>
           </a:p>
@@ -4320,7 +4315,6 @@
               <a:rPr lang="en-US" sz="3400" dirty="0"/>
               <a:t>Complex numbers</a:t>
             </a:r>
-            <a:endParaRPr lang="en-US" sz="3400" dirty="0"/>
           </a:p>
         </p:txBody>
       </p:sp>
@@ -5062,11 +5056,7 @@
           <a:p>
             <a:r>
               <a:rPr lang="en-US" dirty="0" smtClean="0"/>
-              <a:t>ACT DAY </a:t>
-            </a:r>
-            <a:r>
-              <a:rPr lang="en-US" dirty="0" smtClean="0"/>
-              <a:t>2</a:t>
+              <a:t>ACT DAY 2</a:t>
             </a:r>
             <a:endParaRPr lang="en-US" dirty="0"/>
           </a:p>
@@ -5101,42 +5091,41 @@
               <a:rPr lang="en-US" sz="3400" dirty="0" smtClean="0"/>
               <a:t>ACT Prep Guidelines</a:t>
             </a:r>
-            <a:endParaRPr lang="en-US" sz="3400" dirty="0" smtClean="0"/>
           </a:p>
           <a:p>
             <a:r>
               <a:rPr lang="en-US" sz="3400" dirty="0" smtClean="0"/>
               <a:t>Math Mini Test 1</a:t>
             </a:r>
+          </a:p>
+          <a:p>
+            <a:r>
+              <a:rPr lang="en-US" sz="3400" dirty="0" smtClean="0"/>
+              <a:t>Go </a:t>
+            </a:r>
+            <a:r>
+              <a:rPr lang="en-US" sz="3400" dirty="0" smtClean="0"/>
+              <a:t>Over Mini </a:t>
+            </a:r>
+            <a:r>
+              <a:rPr lang="en-US" sz="3400" dirty="0" smtClean="0"/>
+              <a:t>Test</a:t>
+            </a:r>
             <a:endParaRPr lang="en-US" sz="3400" dirty="0" smtClean="0"/>
           </a:p>
           <a:p>
             <a:r>
               <a:rPr lang="en-US" sz="3400" dirty="0" smtClean="0"/>
-              <a:t>Math Mini Test 2</a:t>
-            </a:r>
-          </a:p>
-          <a:p>
+              <a:t>Mini Test </a:t>
+            </a:r>
             <a:r>
               <a:rPr lang="en-US" sz="3400" dirty="0" smtClean="0"/>
-              <a:t>Go Over Mini Tests</a:t>
-            </a:r>
-            <a:endParaRPr lang="en-US" sz="3400" dirty="0" smtClean="0"/>
-          </a:p>
-          <a:p>
+              <a:t>2 </a:t>
+            </a:r>
             <a:r>
               <a:rPr lang="en-US" sz="3400" dirty="0" smtClean="0"/>
-              <a:t>Mini </a:t>
-            </a:r>
-            <a:r>
-              <a:rPr lang="en-US" sz="3400" dirty="0" smtClean="0"/>
-              <a:t>Test </a:t>
-            </a:r>
-            <a:r>
-              <a:rPr lang="en-US" sz="3400" dirty="0" smtClean="0"/>
-              <a:t>3 (in class/take home)</a:t>
-            </a:r>
-            <a:endParaRPr lang="en-US" sz="3400" dirty="0" smtClean="0"/>
+              <a:t>(in class/take home)</a:t>
+            </a:r>
           </a:p>
           <a:p>
             <a:endParaRPr lang="en-US" sz="3400" dirty="0"/>
@@ -5626,7 +5615,11 @@
             </a:r>
             <a:r>
               <a:rPr lang="en-US" dirty="0" smtClean="0"/>
-              <a:t>2</a:t>
+              <a:t>2 (</a:t>
+            </a:r>
+            <a:r>
+              <a:rPr lang="en-US" smtClean="0"/>
+              <a:t>in class/homework)</a:t>
             </a:r>
             <a:endParaRPr lang="en-US" dirty="0"/>
           </a:p>
@@ -5721,95 +5714,6 @@
           <a:p>
             <a:r>
               <a:rPr lang="en-US" dirty="0" smtClean="0"/>
-              <a:t>Read the Directions before the Test Day</a:t>
-            </a:r>
-            <a:endParaRPr lang="en-US" dirty="0"/>
-          </a:p>
-        </p:txBody>
-      </p:sp>
-      <p:pic>
-        <p:nvPicPr>
-          <p:cNvPr id="4" name="Content Placeholder 3"/>
-          <p:cNvPicPr>
-            <a:picLocks noGrp="1" noChangeAspect="1"/>
-          </p:cNvPicPr>
-          <p:nvPr>
-            <p:ph idx="1"/>
-          </p:nvPr>
-        </p:nvPicPr>
-        <p:blipFill>
-          <a:blip r:embed="rId2">
-            <a:extLst>
-              <a:ext uri="{28A0092B-C50C-407E-A947-70E740481C1C}">
-                <a14:useLocalDpi xmlns:a14="http://schemas.microsoft.com/office/drawing/2010/main" val="0"/>
-              </a:ext>
-            </a:extLst>
-          </a:blip>
-          <a:stretch>
-            <a:fillRect/>
-          </a:stretch>
-        </p:blipFill>
-        <p:spPr>
-          <a:xfrm>
-            <a:off x="212696" y="1691640"/>
-            <a:ext cx="11919008" cy="4876799"/>
-          </a:xfrm>
-        </p:spPr>
-      </p:pic>
-    </p:spTree>
-    <p:extLst>
-      <p:ext uri="{BB962C8B-B14F-4D97-AF65-F5344CB8AC3E}">
-        <p14:creationId xmlns:p14="http://schemas.microsoft.com/office/powerpoint/2010/main" val="2761803185"/>
-      </p:ext>
-    </p:extLst>
-  </p:cSld>
-  <p:clrMapOvr>
-    <a:masterClrMapping/>
-  </p:clrMapOvr>
-  <p:timing>
-    <p:tnLst>
-      <p:par>
-        <p:cTn id="1" dur="indefinite" restart="never" nodeType="tmRoot"/>
-      </p:par>
-    </p:tnLst>
-  </p:timing>
-</p:sld>
-</file>
-
-<file path=ppt/slides/slide27.xml><?xml version="1.0" encoding="utf-8"?>
-<p:sld xmlns:a="http://schemas.openxmlformats.org/drawingml/2006/main" xmlns:r="http://schemas.openxmlformats.org/officeDocument/2006/relationships" xmlns:p="http://schemas.openxmlformats.org/presentationml/2006/main">
-  <p:cSld>
-    <p:spTree>
-      <p:nvGrpSpPr>
-        <p:cNvPr id="1" name=""/>
-        <p:cNvGrpSpPr/>
-        <p:nvPr/>
-      </p:nvGrpSpPr>
-      <p:grpSpPr>
-        <a:xfrm>
-          <a:off x="0" y="0"/>
-          <a:ext cx="0" cy="0"/>
-          <a:chOff x="0" y="0"/>
-          <a:chExt cx="0" cy="0"/>
-        </a:xfrm>
-      </p:grpSpPr>
-      <p:sp>
-        <p:nvSpPr>
-          <p:cNvPr id="2" name="Title 1"/>
-          <p:cNvSpPr>
-            <a:spLocks noGrp="1"/>
-          </p:cNvSpPr>
-          <p:nvPr>
-            <p:ph type="title"/>
-          </p:nvPr>
-        </p:nvSpPr>
-        <p:spPr/>
-        <p:txBody>
-          <a:bodyPr/>
-          <a:lstStyle/>
-          <a:p>
-            <a:r>
-              <a:rPr lang="en-US" dirty="0" smtClean="0"/>
               <a:t>Go Over Mini Test 1 and Mini Test 2</a:t>
             </a:r>
             <a:endParaRPr lang="en-US" dirty="0"/>
@@ -6398,7 +6302,6 @@
               <a:rPr lang="en-US" sz="3000" dirty="0"/>
               <a:t>Understanding simple descriptive statistics</a:t>
             </a:r>
-            <a:endParaRPr lang="en-US" sz="3000" dirty="0"/>
           </a:p>
         </p:txBody>
       </p:sp>

</xml_diff>